<commit_message>
Activity diagram, Sequence diagram and State diagram implemented.
</commit_message>
<xml_diff>
--- a/Lezioni/UML/Slides-UML.pptx
+++ b/Lezioni/UML/Slides-UML.pptx
@@ -5,7 +5,7 @@
     <p:sldMasterId id="2147483648" r:id="rId1"/>
   </p:sldMasterIdLst>
   <p:notesMasterIdLst>
-    <p:notesMasterId r:id="rId14"/>
+    <p:notesMasterId r:id="rId17"/>
   </p:notesMasterIdLst>
   <p:sldIdLst>
     <p:sldId id="256" r:id="rId2"/>
@@ -20,16 +20,19 @@
     <p:sldId id="265" r:id="rId11"/>
     <p:sldId id="266" r:id="rId12"/>
     <p:sldId id="267" r:id="rId13"/>
+    <p:sldId id="268" r:id="rId14"/>
+    <p:sldId id="269" r:id="rId15"/>
+    <p:sldId id="270" r:id="rId16"/>
   </p:sldIdLst>
   <p:sldSz cx="12192000" cy="6858000"/>
   <p:notesSz cx="6858000" cy="9144000"/>
   <p:embeddedFontLst>
     <p:embeddedFont>
       <p:font typeface="Century Gothic" panose="020B0502020202020204" pitchFamily="34" charset="0"/>
-      <p:regular r:id="rId15"/>
-      <p:bold r:id="rId16"/>
-      <p:italic r:id="rId17"/>
-      <p:boldItalic r:id="rId18"/>
+      <p:regular r:id="rId18"/>
+      <p:bold r:id="rId19"/>
+      <p:italic r:id="rId20"/>
+      <p:boldItalic r:id="rId21"/>
     </p:embeddedFont>
   </p:embeddedFontLst>
   <p:defaultTextStyle>
@@ -266,7 +269,7 @@
       <p15:sldGuideLst xmlns:p15="http://schemas.microsoft.com/office/powerpoint/2012/main"/>
     </p:ext>
     <p:ext uri="http://customooxmlschemas.google.com/">
-      <go:slidesCustomData xmlns="" xmlns:mc="http://schemas.openxmlformats.org/markup-compatibility/2006" xmlns:mv="urn:schemas-microsoft-com:mac:vml" xmlns:c="http://schemas.openxmlformats.org/drawingml/2006/chart" xmlns:dgm="http://schemas.openxmlformats.org/drawingml/2006/diagram" xmlns:o="urn:schemas-microsoft-com:office:office" xmlns:v="urn:schemas-microsoft-com:vml" xmlns:pvml="urn:schemas-microsoft-com:office:powerpoint" xmlns:com="http://schemas.openxmlformats.org/drawingml/2006/compatibility" xmlns:p14="http://schemas.microsoft.com/office/powerpoint/2010/main" xmlns:p15="http://schemas.microsoft.com/office/powerpoint/2012/main" xmlns:ahyp="http://schemas.microsoft.com/office/drawing/2018/hyperlinkcolor" xmlns:go="http://customooxmlschemas.google.com/" r:id="rId21" roundtripDataSignature="AMtx7miygiSJJFvCKJBiuYsmPPE89KVjKQ=="/>
+      <go:slidesCustomData xmlns:go="http://customooxmlschemas.google.com/" xmlns:ahyp="http://schemas.microsoft.com/office/drawing/2018/hyperlinkcolor" xmlns:p15="http://schemas.microsoft.com/office/powerpoint/2012/main" xmlns:p14="http://schemas.microsoft.com/office/powerpoint/2010/main" xmlns:com="http://schemas.openxmlformats.org/drawingml/2006/compatibility" xmlns:pvml="urn:schemas-microsoft-com:office:powerpoint" xmlns:v="urn:schemas-microsoft-com:vml" xmlns:o="urn:schemas-microsoft-com:office:office" xmlns:dgm="http://schemas.openxmlformats.org/drawingml/2006/diagram" xmlns:c="http://schemas.openxmlformats.org/drawingml/2006/chart" xmlns:mv="urn:schemas-microsoft-com:mac:vml" xmlns:mc="http://schemas.openxmlformats.org/markup-compatibility/2006" xmlns="" r:id="rId22" roundtripDataSignature="AMtx7miygiSJJFvCKJBiuYsmPPE89KVjKQ=="/>
     </p:ext>
   </p:extLst>
 </p:presentation>
@@ -17274,6 +17277,375 @@
 </p:sld>
 </file>
 
+<file path=ppt/slides/slide13.xml><?xml version="1.0" encoding="utf-8"?>
+<p:sld xmlns:a="http://schemas.openxmlformats.org/drawingml/2006/main" xmlns:r="http://schemas.openxmlformats.org/officeDocument/2006/relationships" xmlns:p="http://schemas.openxmlformats.org/presentationml/2006/main">
+  <p:cSld>
+    <p:spTree>
+      <p:nvGrpSpPr>
+        <p:cNvPr id="1" name=""/>
+        <p:cNvGrpSpPr/>
+        <p:nvPr/>
+      </p:nvGrpSpPr>
+      <p:grpSpPr>
+        <a:xfrm>
+          <a:off x="0" y="0"/>
+          <a:ext cx="0" cy="0"/>
+          <a:chOff x="0" y="0"/>
+          <a:chExt cx="0" cy="0"/>
+        </a:xfrm>
+      </p:grpSpPr>
+      <p:sp>
+        <p:nvSpPr>
+          <p:cNvPr id="2" name="Title 1"/>
+          <p:cNvSpPr>
+            <a:spLocks noGrp="1"/>
+          </p:cNvSpPr>
+          <p:nvPr>
+            <p:ph type="title"/>
+          </p:nvPr>
+        </p:nvSpPr>
+        <p:spPr>
+          <a:xfrm>
+            <a:off x="684213" y="685800"/>
+            <a:ext cx="3211131" cy="1655064"/>
+          </a:xfrm>
+        </p:spPr>
+        <p:txBody>
+          <a:bodyPr/>
+          <a:lstStyle/>
+          <a:p>
+            <a:r>
+              <a:rPr lang="en-GB" dirty="0" smtClean="0"/>
+              <a:t>DIAGRAMMA DELLE ATTIVITA`</a:t>
+            </a:r>
+            <a:endParaRPr lang="en-US" dirty="0"/>
+          </a:p>
+        </p:txBody>
+      </p:sp>
+      <p:sp>
+        <p:nvSpPr>
+          <p:cNvPr id="3" name="Text Placeholder 2"/>
+          <p:cNvSpPr>
+            <a:spLocks noGrp="1"/>
+          </p:cNvSpPr>
+          <p:nvPr>
+            <p:ph type="body" idx="1"/>
+          </p:nvPr>
+        </p:nvSpPr>
+        <p:spPr>
+          <a:xfrm>
+            <a:off x="4315968" y="182880"/>
+            <a:ext cx="4904232" cy="6519672"/>
+          </a:xfrm>
+        </p:spPr>
+        <p:txBody>
+          <a:bodyPr/>
+          <a:lstStyle/>
+          <a:p>
+            <a:endParaRPr lang="en-US" dirty="0"/>
+          </a:p>
+        </p:txBody>
+      </p:sp>
+      <p:pic>
+        <p:nvPicPr>
+          <p:cNvPr id="4" name="Picture 3"/>
+          <p:cNvPicPr>
+            <a:picLocks noChangeAspect="1"/>
+          </p:cNvPicPr>
+          <p:nvPr/>
+        </p:nvPicPr>
+        <p:blipFill>
+          <a:blip r:embed="rId2">
+            <a:extLst>
+              <a:ext uri="{28A0092B-C50C-407E-A947-70E740481C1C}">
+                <a14:useLocalDpi xmlns:a14="http://schemas.microsoft.com/office/drawing/2010/main" val="0"/>
+              </a:ext>
+            </a:extLst>
+          </a:blip>
+          <a:stretch>
+            <a:fillRect/>
+          </a:stretch>
+        </p:blipFill>
+        <p:spPr>
+          <a:xfrm>
+            <a:off x="5003895" y="348728"/>
+            <a:ext cx="3665538" cy="6187976"/>
+          </a:xfrm>
+          <a:prstGeom prst="rect">
+            <a:avLst/>
+          </a:prstGeom>
+        </p:spPr>
+      </p:pic>
+    </p:spTree>
+    <p:extLst>
+      <p:ext uri="{BB962C8B-B14F-4D97-AF65-F5344CB8AC3E}">
+        <p14:creationId xmlns:p14="http://schemas.microsoft.com/office/powerpoint/2010/main" val="1816725251"/>
+      </p:ext>
+    </p:extLst>
+  </p:cSld>
+  <p:clrMapOvr>
+    <a:masterClrMapping/>
+  </p:clrMapOvr>
+  <p:timing>
+    <p:tnLst>
+      <p:par>
+        <p:cTn id="1" dur="indefinite" restart="never" nodeType="tmRoot"/>
+      </p:par>
+    </p:tnLst>
+  </p:timing>
+</p:sld>
+</file>
+
+<file path=ppt/slides/slide14.xml><?xml version="1.0" encoding="utf-8"?>
+<p:sld xmlns:a="http://schemas.openxmlformats.org/drawingml/2006/main" xmlns:r="http://schemas.openxmlformats.org/officeDocument/2006/relationships" xmlns:p="http://schemas.openxmlformats.org/presentationml/2006/main">
+  <p:cSld>
+    <p:spTree>
+      <p:nvGrpSpPr>
+        <p:cNvPr id="1" name=""/>
+        <p:cNvGrpSpPr/>
+        <p:nvPr/>
+      </p:nvGrpSpPr>
+      <p:grpSpPr>
+        <a:xfrm>
+          <a:off x="0" y="0"/>
+          <a:ext cx="0" cy="0"/>
+          <a:chOff x="0" y="0"/>
+          <a:chExt cx="0" cy="0"/>
+        </a:xfrm>
+      </p:grpSpPr>
+      <p:sp>
+        <p:nvSpPr>
+          <p:cNvPr id="2" name="Title 1"/>
+          <p:cNvSpPr>
+            <a:spLocks noGrp="1"/>
+          </p:cNvSpPr>
+          <p:nvPr>
+            <p:ph type="title"/>
+          </p:nvPr>
+        </p:nvSpPr>
+        <p:spPr>
+          <a:xfrm>
+            <a:off x="684213" y="685800"/>
+            <a:ext cx="2959319" cy="2338754"/>
+          </a:xfrm>
+        </p:spPr>
+        <p:txBody>
+          <a:bodyPr/>
+          <a:lstStyle/>
+          <a:p>
+            <a:r>
+              <a:rPr lang="en-GB" dirty="0" smtClean="0"/>
+              <a:t>DIAGRAMMA DI SEQUENZA</a:t>
+            </a:r>
+            <a:endParaRPr lang="en-US" dirty="0"/>
+          </a:p>
+        </p:txBody>
+      </p:sp>
+      <p:sp>
+        <p:nvSpPr>
+          <p:cNvPr id="3" name="Text Placeholder 2"/>
+          <p:cNvSpPr>
+            <a:spLocks noGrp="1"/>
+          </p:cNvSpPr>
+          <p:nvPr>
+            <p:ph type="body" idx="1"/>
+          </p:nvPr>
+        </p:nvSpPr>
+        <p:spPr>
+          <a:xfrm>
+            <a:off x="3643533" y="316522"/>
+            <a:ext cx="6027077" cy="6182751"/>
+          </a:xfrm>
+        </p:spPr>
+        <p:txBody>
+          <a:bodyPr/>
+          <a:lstStyle/>
+          <a:p>
+            <a:endParaRPr lang="en-US" dirty="0"/>
+          </a:p>
+        </p:txBody>
+      </p:sp>
+      <p:pic>
+        <p:nvPicPr>
+          <p:cNvPr id="4" name="Picture 3"/>
+          <p:cNvPicPr>
+            <a:picLocks noChangeAspect="1"/>
+          </p:cNvPicPr>
+          <p:nvPr/>
+        </p:nvPicPr>
+        <p:blipFill>
+          <a:blip r:embed="rId2">
+            <a:extLst>
+              <a:ext uri="{28A0092B-C50C-407E-A947-70E740481C1C}">
+                <a14:useLocalDpi xmlns:a14="http://schemas.microsoft.com/office/drawing/2010/main" val="0"/>
+              </a:ext>
+            </a:extLst>
+          </a:blip>
+          <a:stretch>
+            <a:fillRect/>
+          </a:stretch>
+        </p:blipFill>
+        <p:spPr>
+          <a:xfrm>
+            <a:off x="3837426" y="447270"/>
+            <a:ext cx="5639289" cy="5921253"/>
+          </a:xfrm>
+          <a:prstGeom prst="rect">
+            <a:avLst/>
+          </a:prstGeom>
+        </p:spPr>
+      </p:pic>
+    </p:spTree>
+    <p:extLst>
+      <p:ext uri="{BB962C8B-B14F-4D97-AF65-F5344CB8AC3E}">
+        <p14:creationId xmlns:p14="http://schemas.microsoft.com/office/powerpoint/2010/main" val="3308982960"/>
+      </p:ext>
+    </p:extLst>
+  </p:cSld>
+  <p:clrMapOvr>
+    <a:masterClrMapping/>
+  </p:clrMapOvr>
+  <p:timing>
+    <p:tnLst>
+      <p:par>
+        <p:cTn id="1" dur="indefinite" restart="never" nodeType="tmRoot"/>
+      </p:par>
+    </p:tnLst>
+  </p:timing>
+</p:sld>
+</file>
+
+<file path=ppt/slides/slide15.xml><?xml version="1.0" encoding="utf-8"?>
+<p:sld xmlns:a="http://schemas.openxmlformats.org/drawingml/2006/main" xmlns:r="http://schemas.openxmlformats.org/officeDocument/2006/relationships" xmlns:p="http://schemas.openxmlformats.org/presentationml/2006/main">
+  <p:cSld>
+    <p:spTree>
+      <p:nvGrpSpPr>
+        <p:cNvPr id="1" name=""/>
+        <p:cNvGrpSpPr/>
+        <p:nvPr/>
+      </p:nvGrpSpPr>
+      <p:grpSpPr>
+        <a:xfrm>
+          <a:off x="0" y="0"/>
+          <a:ext cx="0" cy="0"/>
+          <a:chOff x="0" y="0"/>
+          <a:chExt cx="0" cy="0"/>
+        </a:xfrm>
+      </p:grpSpPr>
+      <p:sp>
+        <p:nvSpPr>
+          <p:cNvPr id="2" name="Title 1"/>
+          <p:cNvSpPr>
+            <a:spLocks noGrp="1"/>
+          </p:cNvSpPr>
+          <p:nvPr>
+            <p:ph type="title"/>
+          </p:nvPr>
+        </p:nvSpPr>
+        <p:spPr>
+          <a:xfrm>
+            <a:off x="684212" y="987552"/>
+            <a:ext cx="5616003" cy="694944"/>
+          </a:xfrm>
+        </p:spPr>
+        <p:txBody>
+          <a:bodyPr>
+            <a:normAutofit fontScale="90000"/>
+          </a:bodyPr>
+          <a:lstStyle/>
+          <a:p>
+            <a:r>
+              <a:rPr lang="en-GB" dirty="0" smtClean="0"/>
+              <a:t/>
+            </a:r>
+            <a:br>
+              <a:rPr lang="en-GB" dirty="0" smtClean="0"/>
+            </a:br>
+            <a:r>
+              <a:rPr lang="en-GB" dirty="0" smtClean="0"/>
+              <a:t>DIAGRAMMA DEGLI STATI</a:t>
+            </a:r>
+            <a:br>
+              <a:rPr lang="en-GB" dirty="0" smtClean="0"/>
+            </a:br>
+            <a:endParaRPr lang="en-US" dirty="0"/>
+          </a:p>
+        </p:txBody>
+      </p:sp>
+      <p:sp>
+        <p:nvSpPr>
+          <p:cNvPr id="3" name="Text Placeholder 2"/>
+          <p:cNvSpPr>
+            <a:spLocks noGrp="1"/>
+          </p:cNvSpPr>
+          <p:nvPr>
+            <p:ph type="body" idx="1"/>
+          </p:nvPr>
+        </p:nvSpPr>
+        <p:spPr>
+          <a:xfrm>
+            <a:off x="684212" y="2194560"/>
+            <a:ext cx="8535988" cy="3895344"/>
+          </a:xfrm>
+        </p:spPr>
+        <p:txBody>
+          <a:bodyPr/>
+          <a:lstStyle/>
+          <a:p>
+            <a:endParaRPr lang="en-US" dirty="0"/>
+          </a:p>
+        </p:txBody>
+      </p:sp>
+      <p:pic>
+        <p:nvPicPr>
+          <p:cNvPr id="6" name="Picture 5"/>
+          <p:cNvPicPr>
+            <a:picLocks noChangeAspect="1"/>
+          </p:cNvPicPr>
+          <p:nvPr/>
+        </p:nvPicPr>
+        <p:blipFill>
+          <a:blip r:embed="rId2">
+            <a:extLst>
+              <a:ext uri="{28A0092B-C50C-407E-A947-70E740481C1C}">
+                <a14:useLocalDpi xmlns:a14="http://schemas.microsoft.com/office/drawing/2010/main" val="0"/>
+              </a:ext>
+            </a:extLst>
+          </a:blip>
+          <a:stretch>
+            <a:fillRect/>
+          </a:stretch>
+        </p:blipFill>
+        <p:spPr>
+          <a:xfrm>
+            <a:off x="2140182" y="2697349"/>
+            <a:ext cx="5624047" cy="3017782"/>
+          </a:xfrm>
+          <a:prstGeom prst="rect">
+            <a:avLst/>
+          </a:prstGeom>
+        </p:spPr>
+      </p:pic>
+    </p:spTree>
+    <p:extLst>
+      <p:ext uri="{BB962C8B-B14F-4D97-AF65-F5344CB8AC3E}">
+        <p14:creationId xmlns:p14="http://schemas.microsoft.com/office/powerpoint/2010/main" val="3307599865"/>
+      </p:ext>
+    </p:extLst>
+  </p:cSld>
+  <p:clrMapOvr>
+    <a:masterClrMapping/>
+  </p:clrMapOvr>
+  <p:timing>
+    <p:tnLst>
+      <p:par>
+        <p:cTn id="1" dur="indefinite" restart="never" nodeType="tmRoot"/>
+      </p:par>
+    </p:tnLst>
+  </p:timing>
+</p:sld>
+</file>
+
 <file path=ppt/slides/slide2.xml><?xml version="1.0" encoding="utf-8"?>
 <p:sld xmlns:a="http://schemas.openxmlformats.org/drawingml/2006/main" xmlns:r="http://schemas.openxmlformats.org/officeDocument/2006/relationships" xmlns:p="http://schemas.openxmlformats.org/presentationml/2006/main">
   <p:cSld>

</xml_diff>

<commit_message>
Use case diagram added.
</commit_message>
<xml_diff>
--- a/Lezioni/UML/Slides-UML.pptx
+++ b/Lezioni/UML/Slides-UML.pptx
@@ -5,7 +5,7 @@
     <p:sldMasterId id="2147483648" r:id="rId1"/>
   </p:sldMasterIdLst>
   <p:notesMasterIdLst>
-    <p:notesMasterId r:id="rId17"/>
+    <p:notesMasterId r:id="rId18"/>
   </p:notesMasterIdLst>
   <p:sldIdLst>
     <p:sldId id="256" r:id="rId2"/>
@@ -20,19 +20,20 @@
     <p:sldId id="265" r:id="rId11"/>
     <p:sldId id="266" r:id="rId12"/>
     <p:sldId id="267" r:id="rId13"/>
-    <p:sldId id="268" r:id="rId14"/>
-    <p:sldId id="269" r:id="rId15"/>
-    <p:sldId id="270" r:id="rId16"/>
+    <p:sldId id="271" r:id="rId14"/>
+    <p:sldId id="268" r:id="rId15"/>
+    <p:sldId id="269" r:id="rId16"/>
+    <p:sldId id="270" r:id="rId17"/>
   </p:sldIdLst>
   <p:sldSz cx="12192000" cy="6858000"/>
   <p:notesSz cx="6858000" cy="9144000"/>
   <p:embeddedFontLst>
     <p:embeddedFont>
       <p:font typeface="Century Gothic" panose="020B0502020202020204" pitchFamily="34" charset="0"/>
-      <p:regular r:id="rId18"/>
-      <p:bold r:id="rId19"/>
-      <p:italic r:id="rId20"/>
-      <p:boldItalic r:id="rId21"/>
+      <p:regular r:id="rId19"/>
+      <p:bold r:id="rId20"/>
+      <p:italic r:id="rId21"/>
+      <p:boldItalic r:id="rId22"/>
     </p:embeddedFont>
   </p:embeddedFontLst>
   <p:defaultTextStyle>
@@ -269,7 +270,7 @@
       <p15:sldGuideLst xmlns:p15="http://schemas.microsoft.com/office/powerpoint/2012/main"/>
     </p:ext>
     <p:ext uri="http://customooxmlschemas.google.com/">
-      <go:slidesCustomData xmlns:go="http://customooxmlschemas.google.com/" xmlns:ahyp="http://schemas.microsoft.com/office/drawing/2018/hyperlinkcolor" xmlns:p15="http://schemas.microsoft.com/office/powerpoint/2012/main" xmlns:p14="http://schemas.microsoft.com/office/powerpoint/2010/main" xmlns:com="http://schemas.openxmlformats.org/drawingml/2006/compatibility" xmlns:pvml="urn:schemas-microsoft-com:office:powerpoint" xmlns:v="urn:schemas-microsoft-com:vml" xmlns:o="urn:schemas-microsoft-com:office:office" xmlns:dgm="http://schemas.openxmlformats.org/drawingml/2006/diagram" xmlns:c="http://schemas.openxmlformats.org/drawingml/2006/chart" xmlns:mv="urn:schemas-microsoft-com:mac:vml" xmlns:mc="http://schemas.openxmlformats.org/markup-compatibility/2006" xmlns="" r:id="rId22" roundtripDataSignature="AMtx7miygiSJJFvCKJBiuYsmPPE89KVjKQ=="/>
+      <go:slidesCustomData xmlns="" xmlns:mc="http://schemas.openxmlformats.org/markup-compatibility/2006" xmlns:mv="urn:schemas-microsoft-com:mac:vml" xmlns:c="http://schemas.openxmlformats.org/drawingml/2006/chart" xmlns:dgm="http://schemas.openxmlformats.org/drawingml/2006/diagram" xmlns:o="urn:schemas-microsoft-com:office:office" xmlns:v="urn:schemas-microsoft-com:vml" xmlns:pvml="urn:schemas-microsoft-com:office:powerpoint" xmlns:com="http://schemas.openxmlformats.org/drawingml/2006/compatibility" xmlns:p14="http://schemas.microsoft.com/office/powerpoint/2010/main" xmlns:p15="http://schemas.microsoft.com/office/powerpoint/2012/main" xmlns:ahyp="http://schemas.microsoft.com/office/drawing/2018/hyperlinkcolor" xmlns:go="http://customooxmlschemas.google.com/" r:id="rId23" roundtripDataSignature="AMtx7miygiSJJFvCKJBiuYsmPPE89KVjKQ=="/>
     </p:ext>
   </p:extLst>
 </p:presentation>
@@ -1878,8 +1879,8 @@
         </p:nvSpPr>
         <p:spPr>
           <a:xfrm>
-            <a:off x="1143225" y="685800"/>
-            <a:ext cx="4572225" cy="3429000"/>
+            <a:off x="381000" y="685800"/>
+            <a:ext cx="6096000" cy="3429000"/>
           </a:xfrm>
           <a:custGeom>
             <a:avLst/>
@@ -2722,7 +2723,7 @@
             </a:pPr>
             <a:fld id="{00000000-1234-1234-1234-123412341234}" type="slidenum">
               <a:rPr lang="en-GB"/>
-              <a:t>‹#›</a:t>
+              <a:t>‹Nr.›</a:t>
             </a:fld>
             <a:endParaRPr/>
           </a:p>
@@ -3558,7 +3559,7 @@
             </a:pPr>
             <a:fld id="{00000000-1234-1234-1234-123412341234}" type="slidenum">
               <a:rPr lang="en-GB"/>
-              <a:t>‹#›</a:t>
+              <a:t>‹Nr.›</a:t>
             </a:fld>
             <a:endParaRPr/>
           </a:p>
@@ -4268,7 +4269,7 @@
             </a:pPr>
             <a:fld id="{00000000-1234-1234-1234-123412341234}" type="slidenum">
               <a:rPr lang="en-GB"/>
-              <a:t>‹#›</a:t>
+              <a:t>‹Nr.›</a:t>
             </a:fld>
             <a:endParaRPr/>
           </a:p>
@@ -5117,7 +5118,7 @@
             </a:pPr>
             <a:fld id="{00000000-1234-1234-1234-123412341234}" type="slidenum">
               <a:rPr lang="en-GB"/>
-              <a:t>‹#›</a:t>
+              <a:t>‹Nr.›</a:t>
             </a:fld>
             <a:endParaRPr/>
           </a:p>
@@ -5924,7 +5925,7 @@
             </a:pPr>
             <a:fld id="{00000000-1234-1234-1234-123412341234}" type="slidenum">
               <a:rPr lang="en-GB"/>
-              <a:t>‹#›</a:t>
+              <a:t>‹Nr.›</a:t>
             </a:fld>
             <a:endParaRPr/>
           </a:p>
@@ -6772,7 +6773,7 @@
             </a:pPr>
             <a:fld id="{00000000-1234-1234-1234-123412341234}" type="slidenum">
               <a:rPr lang="en-GB"/>
-              <a:t>‹#›</a:t>
+              <a:t>‹Nr.›</a:t>
             </a:fld>
             <a:endParaRPr/>
           </a:p>
@@ -7716,7 +7717,7 @@
             </a:pPr>
             <a:fld id="{00000000-1234-1234-1234-123412341234}" type="slidenum">
               <a:rPr lang="en-GB"/>
-              <a:t>‹#›</a:t>
+              <a:t>‹Nr.›</a:t>
             </a:fld>
             <a:endParaRPr/>
           </a:p>
@@ -8387,7 +8388,7 @@
             </a:pPr>
             <a:fld id="{00000000-1234-1234-1234-123412341234}" type="slidenum">
               <a:rPr lang="en-GB"/>
-              <a:t>‹#›</a:t>
+              <a:t>‹Nr.›</a:t>
             </a:fld>
             <a:endParaRPr/>
           </a:p>
@@ -9057,7 +9058,7 @@
             </a:pPr>
             <a:fld id="{00000000-1234-1234-1234-123412341234}" type="slidenum">
               <a:rPr lang="en-GB"/>
-              <a:t>‹#›</a:t>
+              <a:t>‹Nr.›</a:t>
             </a:fld>
             <a:endParaRPr/>
           </a:p>
@@ -9764,7 +9765,7 @@
             </a:pPr>
             <a:fld id="{00000000-1234-1234-1234-123412341234}" type="slidenum">
               <a:rPr lang="en-GB"/>
-              <a:t>‹#›</a:t>
+              <a:t>‹Nr.›</a:t>
             </a:fld>
             <a:endParaRPr/>
           </a:p>
@@ -10434,7 +10435,7 @@
             </a:pPr>
             <a:fld id="{00000000-1234-1234-1234-123412341234}" type="slidenum">
               <a:rPr lang="en-GB"/>
-              <a:t>‹#›</a:t>
+              <a:t>‹Nr.›</a:t>
             </a:fld>
             <a:endParaRPr/>
           </a:p>
@@ -11141,7 +11142,7 @@
             </a:pPr>
             <a:fld id="{00000000-1234-1234-1234-123412341234}" type="slidenum">
               <a:rPr lang="en-GB"/>
-              <a:t>‹#›</a:t>
+              <a:t>‹Nr.›</a:t>
             </a:fld>
             <a:endParaRPr/>
           </a:p>
@@ -11944,7 +11945,7 @@
             </a:pPr>
             <a:fld id="{00000000-1234-1234-1234-123412341234}" type="slidenum">
               <a:rPr lang="en-GB"/>
-              <a:t>‹#›</a:t>
+              <a:t>‹Nr.›</a:t>
             </a:fld>
             <a:endParaRPr/>
           </a:p>
@@ -13022,7 +13023,7 @@
             </a:pPr>
             <a:fld id="{00000000-1234-1234-1234-123412341234}" type="slidenum">
               <a:rPr lang="en-GB"/>
-              <a:t>‹#›</a:t>
+              <a:t>‹Nr.›</a:t>
             </a:fld>
             <a:endParaRPr/>
           </a:p>
@@ -13559,7 +13560,7 @@
             </a:pPr>
             <a:fld id="{00000000-1234-1234-1234-123412341234}" type="slidenum">
               <a:rPr lang="en-GB"/>
-              <a:t>‹#›</a:t>
+              <a:t>‹Nr.›</a:t>
             </a:fld>
             <a:endParaRPr/>
           </a:p>
@@ -13960,7 +13961,7 @@
             </a:pPr>
             <a:fld id="{00000000-1234-1234-1234-123412341234}" type="slidenum">
               <a:rPr lang="en-GB"/>
-              <a:t>‹#›</a:t>
+              <a:t>‹Nr.›</a:t>
             </a:fld>
             <a:endParaRPr/>
           </a:p>
@@ -14764,7 +14765,7 @@
             </a:pPr>
             <a:fld id="{00000000-1234-1234-1234-123412341234}" type="slidenum">
               <a:rPr lang="en-GB"/>
-              <a:t>‹#›</a:t>
+              <a:t>‹Nr.›</a:t>
             </a:fld>
             <a:endParaRPr/>
           </a:p>
@@ -15963,7 +15964,7 @@
             </a:pPr>
             <a:fld id="{00000000-1234-1234-1234-123412341234}" type="slidenum">
               <a:rPr lang="en-GB"/>
-              <a:t>‹#›</a:t>
+              <a:t>‹Nr.›</a:t>
             </a:fld>
             <a:endParaRPr/>
           </a:p>
@@ -17296,6 +17297,118 @@
       </p:grpSpPr>
       <p:sp>
         <p:nvSpPr>
+          <p:cNvPr id="2" name="Titel 1"/>
+          <p:cNvSpPr>
+            <a:spLocks noGrp="1"/>
+          </p:cNvSpPr>
+          <p:nvPr>
+            <p:ph type="title"/>
+          </p:nvPr>
+        </p:nvSpPr>
+        <p:spPr>
+          <a:xfrm>
+            <a:off x="684213" y="685800"/>
+            <a:ext cx="2868884" cy="1186543"/>
+          </a:xfrm>
+        </p:spPr>
+        <p:txBody>
+          <a:bodyPr/>
+          <a:lstStyle/>
+          <a:p>
+            <a:r>
+              <a:rPr lang="de-DE" dirty="0" smtClean="0"/>
+              <a:t>DIAGRAMMA CASI D‘USO</a:t>
+            </a:r>
+            <a:endParaRPr lang="de-DE" dirty="0"/>
+          </a:p>
+        </p:txBody>
+      </p:sp>
+      <p:sp>
+        <p:nvSpPr>
+          <p:cNvPr id="3" name="Textplatzhalter 2"/>
+          <p:cNvSpPr>
+            <a:spLocks noGrp="1"/>
+          </p:cNvSpPr>
+          <p:nvPr>
+            <p:ph type="body" idx="1"/>
+          </p:nvPr>
+        </p:nvSpPr>
+        <p:spPr>
+          <a:xfrm>
+            <a:off x="3727268" y="862149"/>
+            <a:ext cx="6871459" cy="5460274"/>
+          </a:xfrm>
+        </p:spPr>
+        <p:txBody>
+          <a:bodyPr/>
+          <a:lstStyle/>
+          <a:p>
+            <a:endParaRPr lang="de-DE" dirty="0"/>
+          </a:p>
+        </p:txBody>
+      </p:sp>
+      <p:pic>
+        <p:nvPicPr>
+          <p:cNvPr id="4" name="Grafik 3"/>
+          <p:cNvPicPr>
+            <a:picLocks noChangeAspect="1"/>
+          </p:cNvPicPr>
+          <p:nvPr/>
+        </p:nvPicPr>
+        <p:blipFill>
+          <a:blip r:embed="rId2">
+            <a:extLst>
+              <a:ext uri="{28A0092B-C50C-407E-A947-70E740481C1C}">
+                <a14:useLocalDpi xmlns:a14="http://schemas.microsoft.com/office/drawing/2010/main" val="0"/>
+              </a:ext>
+            </a:extLst>
+          </a:blip>
+          <a:stretch>
+            <a:fillRect/>
+          </a:stretch>
+        </p:blipFill>
+        <p:spPr>
+          <a:xfrm>
+            <a:off x="3833545" y="996361"/>
+            <a:ext cx="6658904" cy="5191850"/>
+          </a:xfrm>
+          <a:prstGeom prst="rect">
+            <a:avLst/>
+          </a:prstGeom>
+        </p:spPr>
+      </p:pic>
+    </p:spTree>
+    <p:extLst>
+      <p:ext uri="{BB962C8B-B14F-4D97-AF65-F5344CB8AC3E}">
+        <p14:creationId xmlns:p14="http://schemas.microsoft.com/office/powerpoint/2010/main" val="2453419922"/>
+      </p:ext>
+    </p:extLst>
+  </p:cSld>
+  <p:clrMapOvr>
+    <a:masterClrMapping/>
+  </p:clrMapOvr>
+</p:sld>
+</file>
+
+<file path=ppt/slides/slide14.xml><?xml version="1.0" encoding="utf-8"?>
+<p:sld xmlns:a="http://schemas.openxmlformats.org/drawingml/2006/main" xmlns:r="http://schemas.openxmlformats.org/officeDocument/2006/relationships" xmlns:p="http://schemas.openxmlformats.org/presentationml/2006/main">
+  <p:cSld>
+    <p:spTree>
+      <p:nvGrpSpPr>
+        <p:cNvPr id="1" name=""/>
+        <p:cNvGrpSpPr/>
+        <p:nvPr/>
+      </p:nvGrpSpPr>
+      <p:grpSpPr>
+        <a:xfrm>
+          <a:off x="0" y="0"/>
+          <a:ext cx="0" cy="0"/>
+          <a:chOff x="0" y="0"/>
+          <a:chExt cx="0" cy="0"/>
+        </a:xfrm>
+      </p:grpSpPr>
+      <p:sp>
+        <p:nvSpPr>
           <p:cNvPr id="2" name="Title 1"/>
           <p:cNvSpPr>
             <a:spLocks noGrp="1"/>
@@ -17396,7 +17509,7 @@
 </p:sld>
 </file>
 
-<file path=ppt/slides/slide14.xml><?xml version="1.0" encoding="utf-8"?>
+<file path=ppt/slides/slide15.xml><?xml version="1.0" encoding="utf-8"?>
 <p:sld xmlns:a="http://schemas.openxmlformats.org/drawingml/2006/main" xmlns:r="http://schemas.openxmlformats.org/officeDocument/2006/relationships" xmlns:p="http://schemas.openxmlformats.org/presentationml/2006/main">
   <p:cSld>
     <p:spTree>
@@ -17515,7 +17628,7 @@
 </p:sld>
 </file>
 
-<file path=ppt/slides/slide15.xml><?xml version="1.0" encoding="utf-8"?>
+<file path=ppt/slides/slide16.xml><?xml version="1.0" encoding="utf-8"?>
 <p:sld xmlns:a="http://schemas.openxmlformats.org/drawingml/2006/main" xmlns:r="http://schemas.openxmlformats.org/officeDocument/2006/relationships" xmlns:p="http://schemas.openxmlformats.org/presentationml/2006/main">
   <p:cSld>
     <p:spTree>
@@ -18895,10 +19008,10 @@
               <a:buNone/>
             </a:pPr>
             <a:r>
-              <a:rPr lang="en-GB"/>
+              <a:rPr lang="en-GB" dirty="0"/>
               <a:t>I DIAGRAMMI COMPORTAMENTALI DINAMICI</a:t>
             </a:r>
-            <a:endParaRPr/>
+            <a:endParaRPr dirty="0"/>
           </a:p>
         </p:txBody>
       </p:sp>
@@ -18943,18 +19056,186 @@
               <a:buChar char="•"/>
             </a:pPr>
             <a:r>
-              <a:rPr lang="en-GB">
+              <a:rPr lang="en-GB" dirty="0" err="1">
                 <a:solidFill>
                   <a:srgbClr val="FF0000"/>
                 </a:solidFill>
               </a:rPr>
-              <a:t>Diagramma dei casi d’uso</a:t>
+              <a:t>Diagramma</a:t>
             </a:r>
             <a:r>
-              <a:rPr lang="en-GB"/>
-              <a:t>: rappresenta una particolare funzionalitá del sistema ed il modo in cui i controllori interni ed esterni si relazionano con essa.</a:t>
+              <a:rPr lang="en-GB" dirty="0">
+                <a:solidFill>
+                  <a:srgbClr val="FF0000"/>
+                </a:solidFill>
+              </a:rPr>
+              <a:t> </a:t>
             </a:r>
-            <a:endParaRPr/>
+            <a:r>
+              <a:rPr lang="en-GB" dirty="0" err="1">
+                <a:solidFill>
+                  <a:srgbClr val="FF0000"/>
+                </a:solidFill>
+              </a:rPr>
+              <a:t>dei</a:t>
+            </a:r>
+            <a:r>
+              <a:rPr lang="en-GB" dirty="0">
+                <a:solidFill>
+                  <a:srgbClr val="FF0000"/>
+                </a:solidFill>
+              </a:rPr>
+              <a:t> </a:t>
+            </a:r>
+            <a:r>
+              <a:rPr lang="en-GB" dirty="0" err="1">
+                <a:solidFill>
+                  <a:srgbClr val="FF0000"/>
+                </a:solidFill>
+              </a:rPr>
+              <a:t>casi</a:t>
+            </a:r>
+            <a:r>
+              <a:rPr lang="en-GB" dirty="0">
+                <a:solidFill>
+                  <a:srgbClr val="FF0000"/>
+                </a:solidFill>
+              </a:rPr>
+              <a:t> </a:t>
+            </a:r>
+            <a:r>
+              <a:rPr lang="en-GB" dirty="0" err="1">
+                <a:solidFill>
+                  <a:srgbClr val="FF0000"/>
+                </a:solidFill>
+              </a:rPr>
+              <a:t>d’uso</a:t>
+            </a:r>
+            <a:r>
+              <a:rPr lang="en-GB" dirty="0"/>
+              <a:t>: </a:t>
+            </a:r>
+            <a:r>
+              <a:rPr lang="en-GB" dirty="0" err="1"/>
+              <a:t>rappresenta</a:t>
+            </a:r>
+            <a:r>
+              <a:rPr lang="en-GB" dirty="0"/>
+              <a:t> </a:t>
+            </a:r>
+            <a:r>
+              <a:rPr lang="en-GB" dirty="0" smtClean="0"/>
+              <a:t>le </a:t>
+            </a:r>
+            <a:r>
+              <a:rPr lang="en-GB" dirty="0" err="1" smtClean="0"/>
+              <a:t>funzionalitá</a:t>
+            </a:r>
+            <a:r>
+              <a:rPr lang="en-GB" dirty="0" smtClean="0"/>
+              <a:t> </a:t>
+            </a:r>
+            <a:r>
+              <a:rPr lang="en-GB" dirty="0"/>
+              <a:t>del </a:t>
+            </a:r>
+            <a:r>
+              <a:rPr lang="en-GB" dirty="0" err="1"/>
+              <a:t>sistema</a:t>
+            </a:r>
+            <a:r>
+              <a:rPr lang="en-GB" dirty="0"/>
+              <a:t> </a:t>
+            </a:r>
+            <a:r>
+              <a:rPr lang="en-GB" dirty="0" err="1"/>
+              <a:t>ed</a:t>
+            </a:r>
+            <a:r>
+              <a:rPr lang="en-GB" dirty="0"/>
+              <a:t> </a:t>
+            </a:r>
+            <a:r>
+              <a:rPr lang="en-GB" dirty="0" err="1"/>
+              <a:t>il</a:t>
+            </a:r>
+            <a:r>
+              <a:rPr lang="en-GB" dirty="0"/>
+              <a:t> </a:t>
+            </a:r>
+            <a:r>
+              <a:rPr lang="en-GB" dirty="0" err="1"/>
+              <a:t>modo</a:t>
+            </a:r>
+            <a:r>
+              <a:rPr lang="en-GB" dirty="0"/>
+              <a:t> in cui </a:t>
+            </a:r>
+            <a:r>
+              <a:rPr lang="en-GB" dirty="0" err="1"/>
+              <a:t>i</a:t>
+            </a:r>
+            <a:r>
+              <a:rPr lang="en-GB" dirty="0"/>
+              <a:t> </a:t>
+            </a:r>
+            <a:r>
+              <a:rPr lang="en-GB" dirty="0" err="1"/>
+              <a:t>controllori</a:t>
+            </a:r>
+            <a:r>
+              <a:rPr lang="en-GB" dirty="0"/>
+              <a:t> </a:t>
+            </a:r>
+            <a:r>
+              <a:rPr lang="en-GB" dirty="0" err="1"/>
+              <a:t>interni</a:t>
+            </a:r>
+            <a:r>
+              <a:rPr lang="en-GB" dirty="0"/>
+              <a:t> </a:t>
+            </a:r>
+            <a:r>
+              <a:rPr lang="en-GB" dirty="0" err="1"/>
+              <a:t>ed</a:t>
+            </a:r>
+            <a:r>
+              <a:rPr lang="en-GB" dirty="0"/>
+              <a:t> </a:t>
+            </a:r>
+            <a:r>
+              <a:rPr lang="en-GB" dirty="0" err="1"/>
+              <a:t>esterni</a:t>
+            </a:r>
+            <a:r>
+              <a:rPr lang="en-GB" dirty="0"/>
+              <a:t> </a:t>
+            </a:r>
+            <a:r>
+              <a:rPr lang="en-GB" dirty="0" err="1"/>
+              <a:t>si</a:t>
+            </a:r>
+            <a:r>
+              <a:rPr lang="en-GB" dirty="0"/>
+              <a:t> </a:t>
+            </a:r>
+            <a:r>
+              <a:rPr lang="en-GB" dirty="0" err="1"/>
+              <a:t>relazionano</a:t>
+            </a:r>
+            <a:r>
+              <a:rPr lang="en-GB" dirty="0"/>
+              <a:t> con </a:t>
+            </a:r>
+            <a:r>
+              <a:rPr lang="en-GB" dirty="0" err="1" smtClean="0"/>
+              <a:t>esse</a:t>
+            </a:r>
+            <a:r>
+              <a:rPr lang="en-GB" dirty="0" smtClean="0"/>
+              <a:t>.</a:t>
+            </a:r>
+            <a:endParaRPr dirty="0"/>
           </a:p>
           <a:p>
             <a:pPr marL="342900" lvl="0" indent="-342900" algn="just" rtl="0">
@@ -18969,18 +19250,106 @@
               <a:buChar char="•"/>
             </a:pPr>
             <a:r>
-              <a:rPr lang="en-GB">
+              <a:rPr lang="en-GB" dirty="0" err="1">
                 <a:solidFill>
                   <a:srgbClr val="FF0000"/>
                 </a:solidFill>
               </a:rPr>
-              <a:t>Diagramma delle attivitá</a:t>
+              <a:t>Diagramma</a:t>
             </a:r>
             <a:r>
-              <a:rPr lang="en-GB"/>
-              <a:t>: rappresenta i flussi di lavoro delle entitá del sistema. </a:t>
+              <a:rPr lang="en-GB" dirty="0">
+                <a:solidFill>
+                  <a:srgbClr val="FF0000"/>
+                </a:solidFill>
+              </a:rPr>
+              <a:t> </a:t>
             </a:r>
-            <a:endParaRPr>
+            <a:r>
+              <a:rPr lang="en-GB" dirty="0" err="1">
+                <a:solidFill>
+                  <a:srgbClr val="FF0000"/>
+                </a:solidFill>
+              </a:rPr>
+              <a:t>delle</a:t>
+            </a:r>
+            <a:r>
+              <a:rPr lang="en-GB" dirty="0">
+                <a:solidFill>
+                  <a:srgbClr val="FF0000"/>
+                </a:solidFill>
+              </a:rPr>
+              <a:t> </a:t>
+            </a:r>
+            <a:r>
+              <a:rPr lang="en-GB" dirty="0" err="1">
+                <a:solidFill>
+                  <a:srgbClr val="FF0000"/>
+                </a:solidFill>
+              </a:rPr>
+              <a:t>attivitá</a:t>
+            </a:r>
+            <a:r>
+              <a:rPr lang="en-GB" dirty="0"/>
+              <a:t>: </a:t>
+            </a:r>
+            <a:r>
+              <a:rPr lang="en-GB" dirty="0" err="1"/>
+              <a:t>rappresenta</a:t>
+            </a:r>
+            <a:r>
+              <a:rPr lang="en-GB" dirty="0"/>
+              <a:t> </a:t>
+            </a:r>
+            <a:r>
+              <a:rPr lang="en-GB" dirty="0" err="1"/>
+              <a:t>i</a:t>
+            </a:r>
+            <a:r>
+              <a:rPr lang="en-GB" dirty="0"/>
+              <a:t> </a:t>
+            </a:r>
+            <a:r>
+              <a:rPr lang="en-GB" dirty="0" err="1"/>
+              <a:t>flussi</a:t>
+            </a:r>
+            <a:r>
+              <a:rPr lang="en-GB" dirty="0"/>
+              <a:t> di </a:t>
+            </a:r>
+            <a:r>
+              <a:rPr lang="en-GB" dirty="0" err="1"/>
+              <a:t>lavoro</a:t>
+            </a:r>
+            <a:r>
+              <a:rPr lang="en-GB" dirty="0"/>
+              <a:t> </a:t>
+            </a:r>
+            <a:r>
+              <a:rPr lang="en-GB" dirty="0" err="1"/>
+              <a:t>delle</a:t>
+            </a:r>
+            <a:r>
+              <a:rPr lang="en-GB" dirty="0"/>
+              <a:t> </a:t>
+            </a:r>
+            <a:r>
+              <a:rPr lang="en-GB" dirty="0" err="1"/>
+              <a:t>entitá</a:t>
+            </a:r>
+            <a:r>
+              <a:rPr lang="en-GB" dirty="0"/>
+              <a:t> del </a:t>
+            </a:r>
+            <a:r>
+              <a:rPr lang="en-GB" dirty="0" err="1"/>
+              <a:t>sistema</a:t>
+            </a:r>
+            <a:r>
+              <a:rPr lang="en-GB" dirty="0"/>
+              <a:t>. </a:t>
+            </a:r>
+            <a:endParaRPr dirty="0">
               <a:solidFill>
                 <a:srgbClr val="FF0000"/>
               </a:solidFill>
@@ -18999,18 +19368,82 @@
               <a:buChar char="•"/>
             </a:pPr>
             <a:r>
-              <a:rPr lang="en-GB">
+              <a:rPr lang="en-GB" dirty="0" err="1">
                 <a:solidFill>
                   <a:srgbClr val="FF0000"/>
                 </a:solidFill>
               </a:rPr>
-              <a:t>Diagramma di sequenza</a:t>
+              <a:t>Diagramma</a:t>
             </a:r>
             <a:r>
-              <a:rPr lang="en-GB"/>
-              <a:t>: rappresenta le interazioni tra le entitá del sistema in un particolare scenario. </a:t>
+              <a:rPr lang="en-GB" dirty="0">
+                <a:solidFill>
+                  <a:srgbClr val="FF0000"/>
+                </a:solidFill>
+              </a:rPr>
+              <a:t> di </a:t>
             </a:r>
-            <a:endParaRPr>
+            <a:r>
+              <a:rPr lang="en-GB" dirty="0" err="1">
+                <a:solidFill>
+                  <a:srgbClr val="FF0000"/>
+                </a:solidFill>
+              </a:rPr>
+              <a:t>sequenza</a:t>
+            </a:r>
+            <a:r>
+              <a:rPr lang="en-GB" dirty="0"/>
+              <a:t>: </a:t>
+            </a:r>
+            <a:r>
+              <a:rPr lang="en-GB" dirty="0" err="1"/>
+              <a:t>rappresenta</a:t>
+            </a:r>
+            <a:r>
+              <a:rPr lang="en-GB" dirty="0"/>
+              <a:t> le </a:t>
+            </a:r>
+            <a:r>
+              <a:rPr lang="en-GB" dirty="0" err="1"/>
+              <a:t>interazioni</a:t>
+            </a:r>
+            <a:r>
+              <a:rPr lang="en-GB" dirty="0"/>
+              <a:t> </a:t>
+            </a:r>
+            <a:r>
+              <a:rPr lang="en-GB" dirty="0" err="1"/>
+              <a:t>tra</a:t>
+            </a:r>
+            <a:r>
+              <a:rPr lang="en-GB" dirty="0"/>
+              <a:t> le </a:t>
+            </a:r>
+            <a:r>
+              <a:rPr lang="en-GB" dirty="0" err="1"/>
+              <a:t>entitá</a:t>
+            </a:r>
+            <a:r>
+              <a:rPr lang="en-GB" dirty="0"/>
+              <a:t> del </a:t>
+            </a:r>
+            <a:r>
+              <a:rPr lang="en-GB" dirty="0" err="1"/>
+              <a:t>sistema</a:t>
+            </a:r>
+            <a:r>
+              <a:rPr lang="en-GB" dirty="0"/>
+              <a:t> in un </a:t>
+            </a:r>
+            <a:r>
+              <a:rPr lang="en-GB" dirty="0" err="1"/>
+              <a:t>particolare</a:t>
+            </a:r>
+            <a:r>
+              <a:rPr lang="en-GB" dirty="0"/>
+              <a:t> scenario. </a:t>
+            </a:r>
+            <a:endParaRPr dirty="0">
               <a:solidFill>
                 <a:srgbClr val="FF0000"/>
               </a:solidFill>
@@ -19029,18 +19462,146 @@
               <a:buChar char="•"/>
             </a:pPr>
             <a:r>
-              <a:rPr lang="en-GB">
+              <a:rPr lang="en-GB" dirty="0" err="1">
                 <a:solidFill>
                   <a:srgbClr val="FF0000"/>
                 </a:solidFill>
               </a:rPr>
-              <a:t>Diagramma degli stati</a:t>
+              <a:t>Diagramma</a:t>
             </a:r>
             <a:r>
-              <a:rPr lang="en-GB"/>
-              <a:t>: rappresenta gli eventi e le condizioni che portano le entitá del sistema ad evolvere da uno stato ad un altro.</a:t>
+              <a:rPr lang="en-GB" dirty="0">
+                <a:solidFill>
+                  <a:srgbClr val="FF0000"/>
+                </a:solidFill>
+              </a:rPr>
+              <a:t> </a:t>
             </a:r>
-            <a:endParaRPr>
+            <a:r>
+              <a:rPr lang="en-GB" dirty="0" err="1">
+                <a:solidFill>
+                  <a:srgbClr val="FF0000"/>
+                </a:solidFill>
+              </a:rPr>
+              <a:t>degli</a:t>
+            </a:r>
+            <a:r>
+              <a:rPr lang="en-GB" dirty="0">
+                <a:solidFill>
+                  <a:srgbClr val="FF0000"/>
+                </a:solidFill>
+              </a:rPr>
+              <a:t> </a:t>
+            </a:r>
+            <a:r>
+              <a:rPr lang="en-GB" dirty="0" err="1">
+                <a:solidFill>
+                  <a:srgbClr val="FF0000"/>
+                </a:solidFill>
+              </a:rPr>
+              <a:t>stati</a:t>
+            </a:r>
+            <a:r>
+              <a:rPr lang="en-GB" dirty="0"/>
+              <a:t>: </a:t>
+            </a:r>
+            <a:r>
+              <a:rPr lang="en-GB" dirty="0" err="1"/>
+              <a:t>rappresenta</a:t>
+            </a:r>
+            <a:r>
+              <a:rPr lang="en-GB" dirty="0"/>
+              <a:t> </a:t>
+            </a:r>
+            <a:r>
+              <a:rPr lang="en-GB" dirty="0" err="1"/>
+              <a:t>gli</a:t>
+            </a:r>
+            <a:r>
+              <a:rPr lang="en-GB" dirty="0"/>
+              <a:t> </a:t>
+            </a:r>
+            <a:r>
+              <a:rPr lang="en-GB" dirty="0" err="1"/>
+              <a:t>eventi</a:t>
+            </a:r>
+            <a:r>
+              <a:rPr lang="en-GB" dirty="0"/>
+              <a:t> e le </a:t>
+            </a:r>
+            <a:r>
+              <a:rPr lang="en-GB" dirty="0" err="1"/>
+              <a:t>condizioni</a:t>
+            </a:r>
+            <a:r>
+              <a:rPr lang="en-GB" dirty="0"/>
+              <a:t> </a:t>
+            </a:r>
+            <a:r>
+              <a:rPr lang="en-GB" dirty="0" err="1"/>
+              <a:t>che</a:t>
+            </a:r>
+            <a:r>
+              <a:rPr lang="en-GB" dirty="0"/>
+              <a:t> </a:t>
+            </a:r>
+            <a:r>
+              <a:rPr lang="en-GB" dirty="0" err="1"/>
+              <a:t>portano</a:t>
+            </a:r>
+            <a:r>
+              <a:rPr lang="en-GB" dirty="0"/>
+              <a:t> le </a:t>
+            </a:r>
+            <a:r>
+              <a:rPr lang="en-GB" dirty="0" err="1"/>
+              <a:t>entitá</a:t>
+            </a:r>
+            <a:r>
+              <a:rPr lang="en-GB" dirty="0"/>
+              <a:t> del </a:t>
+            </a:r>
+            <a:r>
+              <a:rPr lang="en-GB" dirty="0" err="1"/>
+              <a:t>sistema</a:t>
+            </a:r>
+            <a:r>
+              <a:rPr lang="en-GB" dirty="0"/>
+              <a:t> ad </a:t>
+            </a:r>
+            <a:r>
+              <a:rPr lang="en-GB" dirty="0" err="1"/>
+              <a:t>evolvere</a:t>
+            </a:r>
+            <a:r>
+              <a:rPr lang="en-GB" dirty="0"/>
+              <a:t> da </a:t>
+            </a:r>
+            <a:r>
+              <a:rPr lang="en-GB" dirty="0" err="1"/>
+              <a:t>uno</a:t>
+            </a:r>
+            <a:r>
+              <a:rPr lang="en-GB" dirty="0"/>
+              <a:t> </a:t>
+            </a:r>
+            <a:r>
+              <a:rPr lang="en-GB" dirty="0" err="1"/>
+              <a:t>stato</a:t>
+            </a:r>
+            <a:r>
+              <a:rPr lang="en-GB" dirty="0"/>
+              <a:t> ad un </a:t>
+            </a:r>
+            <a:r>
+              <a:rPr lang="en-GB" dirty="0" err="1"/>
+              <a:t>altro</a:t>
+            </a:r>
+            <a:r>
+              <a:rPr lang="en-GB" dirty="0"/>
+              <a:t>.</a:t>
+            </a:r>
+            <a:endParaRPr dirty="0">
               <a:solidFill>
                 <a:srgbClr val="FF0000"/>
               </a:solidFill>
@@ -19058,7 +19619,7 @@
               <a:buFont typeface="Arial"/>
               <a:buNone/>
             </a:pPr>
-            <a:endParaRPr/>
+            <a:endParaRPr dirty="0"/>
           </a:p>
         </p:txBody>
       </p:sp>

</xml_diff>

<commit_message>
Use case diagram extended.
</commit_message>
<xml_diff>
--- a/Lezioni/UML/Slides-UML.pptx
+++ b/Lezioni/UML/Slides-UML.pptx
@@ -270,7 +270,7 @@
       <p15:sldGuideLst xmlns:p15="http://schemas.microsoft.com/office/powerpoint/2012/main"/>
     </p:ext>
     <p:ext uri="http://customooxmlschemas.google.com/">
-      <go:slidesCustomData xmlns="" xmlns:mc="http://schemas.openxmlformats.org/markup-compatibility/2006" xmlns:mv="urn:schemas-microsoft-com:mac:vml" xmlns:c="http://schemas.openxmlformats.org/drawingml/2006/chart" xmlns:dgm="http://schemas.openxmlformats.org/drawingml/2006/diagram" xmlns:o="urn:schemas-microsoft-com:office:office" xmlns:v="urn:schemas-microsoft-com:vml" xmlns:pvml="urn:schemas-microsoft-com:office:powerpoint" xmlns:com="http://schemas.openxmlformats.org/drawingml/2006/compatibility" xmlns:p14="http://schemas.microsoft.com/office/powerpoint/2010/main" xmlns:p15="http://schemas.microsoft.com/office/powerpoint/2012/main" xmlns:ahyp="http://schemas.microsoft.com/office/drawing/2018/hyperlinkcolor" xmlns:go="http://customooxmlschemas.google.com/" r:id="rId23" roundtripDataSignature="AMtx7miygiSJJFvCKJBiuYsmPPE89KVjKQ=="/>
+      <go:slidesCustomData xmlns:go="http://customooxmlschemas.google.com/" xmlns:ahyp="http://schemas.microsoft.com/office/drawing/2018/hyperlinkcolor" xmlns:p15="http://schemas.microsoft.com/office/powerpoint/2012/main" xmlns:p14="http://schemas.microsoft.com/office/powerpoint/2010/main" xmlns:com="http://schemas.openxmlformats.org/drawingml/2006/compatibility" xmlns:pvml="urn:schemas-microsoft-com:office:powerpoint" xmlns:v="urn:schemas-microsoft-com:vml" xmlns:o="urn:schemas-microsoft-com:office:office" xmlns:dgm="http://schemas.openxmlformats.org/drawingml/2006/diagram" xmlns:c="http://schemas.openxmlformats.org/drawingml/2006/chart" xmlns:mv="urn:schemas-microsoft-com:mac:vml" xmlns:mc="http://schemas.openxmlformats.org/markup-compatibility/2006" xmlns="" r:id="rId23" roundtripDataSignature="AMtx7miygiSJJFvCKJBiuYsmPPE89KVjKQ=="/>
     </p:ext>
   </p:extLst>
 </p:presentation>
@@ -2723,7 +2723,7 @@
             </a:pPr>
             <a:fld id="{00000000-1234-1234-1234-123412341234}" type="slidenum">
               <a:rPr lang="en-GB"/>
-              <a:t>‹Nr.›</a:t>
+              <a:t>‹#›</a:t>
             </a:fld>
             <a:endParaRPr/>
           </a:p>
@@ -3559,7 +3559,7 @@
             </a:pPr>
             <a:fld id="{00000000-1234-1234-1234-123412341234}" type="slidenum">
               <a:rPr lang="en-GB"/>
-              <a:t>‹Nr.›</a:t>
+              <a:t>‹#›</a:t>
             </a:fld>
             <a:endParaRPr/>
           </a:p>
@@ -4269,7 +4269,7 @@
             </a:pPr>
             <a:fld id="{00000000-1234-1234-1234-123412341234}" type="slidenum">
               <a:rPr lang="en-GB"/>
-              <a:t>‹Nr.›</a:t>
+              <a:t>‹#›</a:t>
             </a:fld>
             <a:endParaRPr/>
           </a:p>
@@ -5118,7 +5118,7 @@
             </a:pPr>
             <a:fld id="{00000000-1234-1234-1234-123412341234}" type="slidenum">
               <a:rPr lang="en-GB"/>
-              <a:t>‹Nr.›</a:t>
+              <a:t>‹#›</a:t>
             </a:fld>
             <a:endParaRPr/>
           </a:p>
@@ -5925,7 +5925,7 @@
             </a:pPr>
             <a:fld id="{00000000-1234-1234-1234-123412341234}" type="slidenum">
               <a:rPr lang="en-GB"/>
-              <a:t>‹Nr.›</a:t>
+              <a:t>‹#›</a:t>
             </a:fld>
             <a:endParaRPr/>
           </a:p>
@@ -6773,7 +6773,7 @@
             </a:pPr>
             <a:fld id="{00000000-1234-1234-1234-123412341234}" type="slidenum">
               <a:rPr lang="en-GB"/>
-              <a:t>‹Nr.›</a:t>
+              <a:t>‹#›</a:t>
             </a:fld>
             <a:endParaRPr/>
           </a:p>
@@ -7717,7 +7717,7 @@
             </a:pPr>
             <a:fld id="{00000000-1234-1234-1234-123412341234}" type="slidenum">
               <a:rPr lang="en-GB"/>
-              <a:t>‹Nr.›</a:t>
+              <a:t>‹#›</a:t>
             </a:fld>
             <a:endParaRPr/>
           </a:p>
@@ -8388,7 +8388,7 @@
             </a:pPr>
             <a:fld id="{00000000-1234-1234-1234-123412341234}" type="slidenum">
               <a:rPr lang="en-GB"/>
-              <a:t>‹Nr.›</a:t>
+              <a:t>‹#›</a:t>
             </a:fld>
             <a:endParaRPr/>
           </a:p>
@@ -9058,7 +9058,7 @@
             </a:pPr>
             <a:fld id="{00000000-1234-1234-1234-123412341234}" type="slidenum">
               <a:rPr lang="en-GB"/>
-              <a:t>‹Nr.›</a:t>
+              <a:t>‹#›</a:t>
             </a:fld>
             <a:endParaRPr/>
           </a:p>
@@ -9765,7 +9765,7 @@
             </a:pPr>
             <a:fld id="{00000000-1234-1234-1234-123412341234}" type="slidenum">
               <a:rPr lang="en-GB"/>
-              <a:t>‹Nr.›</a:t>
+              <a:t>‹#›</a:t>
             </a:fld>
             <a:endParaRPr/>
           </a:p>
@@ -10435,7 +10435,7 @@
             </a:pPr>
             <a:fld id="{00000000-1234-1234-1234-123412341234}" type="slidenum">
               <a:rPr lang="en-GB"/>
-              <a:t>‹Nr.›</a:t>
+              <a:t>‹#›</a:t>
             </a:fld>
             <a:endParaRPr/>
           </a:p>
@@ -11142,7 +11142,7 @@
             </a:pPr>
             <a:fld id="{00000000-1234-1234-1234-123412341234}" type="slidenum">
               <a:rPr lang="en-GB"/>
-              <a:t>‹Nr.›</a:t>
+              <a:t>‹#›</a:t>
             </a:fld>
             <a:endParaRPr/>
           </a:p>
@@ -11945,7 +11945,7 @@
             </a:pPr>
             <a:fld id="{00000000-1234-1234-1234-123412341234}" type="slidenum">
               <a:rPr lang="en-GB"/>
-              <a:t>‹Nr.›</a:t>
+              <a:t>‹#›</a:t>
             </a:fld>
             <a:endParaRPr/>
           </a:p>
@@ -13023,7 +13023,7 @@
             </a:pPr>
             <a:fld id="{00000000-1234-1234-1234-123412341234}" type="slidenum">
               <a:rPr lang="en-GB"/>
-              <a:t>‹Nr.›</a:t>
+              <a:t>‹#›</a:t>
             </a:fld>
             <a:endParaRPr/>
           </a:p>
@@ -13560,7 +13560,7 @@
             </a:pPr>
             <a:fld id="{00000000-1234-1234-1234-123412341234}" type="slidenum">
               <a:rPr lang="en-GB"/>
-              <a:t>‹Nr.›</a:t>
+              <a:t>‹#›</a:t>
             </a:fld>
             <a:endParaRPr/>
           </a:p>
@@ -13961,7 +13961,7 @@
             </a:pPr>
             <a:fld id="{00000000-1234-1234-1234-123412341234}" type="slidenum">
               <a:rPr lang="en-GB"/>
-              <a:t>‹Nr.›</a:t>
+              <a:t>‹#›</a:t>
             </a:fld>
             <a:endParaRPr/>
           </a:p>
@@ -14765,7 +14765,7 @@
             </a:pPr>
             <a:fld id="{00000000-1234-1234-1234-123412341234}" type="slidenum">
               <a:rPr lang="en-GB"/>
-              <a:t>‹Nr.›</a:t>
+              <a:t>‹#›</a:t>
             </a:fld>
             <a:endParaRPr/>
           </a:p>
@@ -15964,7 +15964,7 @@
             </a:pPr>
             <a:fld id="{00000000-1234-1234-1234-123412341234}" type="slidenum">
               <a:rPr lang="en-GB"/>
-              <a:t>‹Nr.›</a:t>
+              <a:t>‹#›</a:t>
             </a:fld>
             <a:endParaRPr/>
           </a:p>
@@ -17336,7 +17336,7 @@
         <p:spPr>
           <a:xfrm>
             <a:off x="3727268" y="862149"/>
-            <a:ext cx="6871459" cy="5460274"/>
+            <a:ext cx="7821604" cy="5460274"/>
           </a:xfrm>
         </p:spPr>
         <p:txBody>
@@ -17349,7 +17349,7 @@
       </p:sp>
       <p:pic>
         <p:nvPicPr>
-          <p:cNvPr id="4" name="Grafik 3"/>
+          <p:cNvPr id="5" name="Picture 4"/>
           <p:cNvPicPr>
             <a:picLocks noChangeAspect="1"/>
           </p:cNvPicPr>
@@ -17369,8 +17369,8 @@
         </p:blipFill>
         <p:spPr>
           <a:xfrm>
-            <a:off x="3833545" y="996361"/>
-            <a:ext cx="6658904" cy="5191850"/>
+            <a:off x="3812718" y="1008882"/>
+            <a:ext cx="7620660" cy="5166808"/>
           </a:xfrm>
           <a:prstGeom prst="rect">
             <a:avLst/>
@@ -17387,6 +17387,13 @@
   <p:clrMapOvr>
     <a:masterClrMapping/>
   </p:clrMapOvr>
+  <p:timing>
+    <p:tnLst>
+      <p:par>
+        <p:cTn id="1" dur="indefinite" restart="never" nodeType="tmRoot"/>
+      </p:par>
+    </p:tnLst>
+  </p:timing>
 </p:sld>
 </file>
 

</xml_diff>